<commit_message>
LC8, LP Loi de conservation, Notes Brahim
</commit_message>
<xml_diff>
--- a/Physique/LeconPhys/LP-Les Symétries en physiques/LP-SymétriesEnPhysique.pptx
+++ b/Physique/LeconPhys/LP-Les Symétries en physiques/LP-SymétriesEnPhysique.pptx
@@ -17,6 +17,7 @@
     <p:sldId id="268" r:id="rId11"/>
     <p:sldId id="269" r:id="rId12"/>
     <p:sldId id="266" r:id="rId13"/>
+    <p:sldId id="270" r:id="rId14"/>
   </p:sldIdLst>
   <p:sldSz cx="12192000" cy="6858000"/>
   <p:notesSz cx="6858000" cy="9144000"/>
@@ -3622,8 +3623,8 @@
           </a:prstGeom>
         </p:spPr>
       </p:pic>
-      <mc:AlternateContent xmlns:mc="http://schemas.openxmlformats.org/markup-compatibility/2006">
-        <mc:Choice xmlns:a14="http://schemas.microsoft.com/office/drawing/2010/main" Requires="a14">
+      <mc:AlternateContent xmlns:mc="http://schemas.openxmlformats.org/markup-compatibility/2006" xmlns:a14="http://schemas.microsoft.com/office/drawing/2010/main">
+        <mc:Choice Requires="a14">
           <p:sp>
             <p:nvSpPr>
               <p:cNvPr id="8" name="TextBox 7">
@@ -3688,7 +3689,7 @@
             </p:txBody>
           </p:sp>
         </mc:Choice>
-        <mc:Fallback>
+        <mc:Fallback xmlns="">
           <p:sp>
             <p:nvSpPr>
               <p:cNvPr id="8" name="TextBox 7">
@@ -3939,6 +3940,66 @@
 </p:sld>
 </file>
 
+<file path=ppt/slides/slide13.xml><?xml version="1.0" encoding="utf-8"?>
+<p:sld xmlns:a="http://schemas.openxmlformats.org/drawingml/2006/main" xmlns:r="http://schemas.openxmlformats.org/officeDocument/2006/relationships" xmlns:p="http://schemas.openxmlformats.org/presentationml/2006/main">
+  <p:cSld>
+    <p:spTree>
+      <p:nvGrpSpPr>
+        <p:cNvPr id="1" name=""/>
+        <p:cNvGrpSpPr/>
+        <p:nvPr/>
+      </p:nvGrpSpPr>
+      <p:grpSpPr>
+        <a:xfrm>
+          <a:off x="0" y="0"/>
+          <a:ext cx="0" cy="0"/>
+          <a:chOff x="0" y="0"/>
+          <a:chExt cx="0" cy="0"/>
+        </a:xfrm>
+      </p:grpSpPr>
+      <p:pic>
+        <p:nvPicPr>
+          <p:cNvPr id="2" name="Picture 1">
+            <a:extLst>
+              <a:ext uri="{FF2B5EF4-FFF2-40B4-BE49-F238E27FC236}">
+                <a16:creationId xmlns:a16="http://schemas.microsoft.com/office/drawing/2014/main" id="{3DA8F686-2D32-4058-A2BD-7F33B64D93AE}"/>
+              </a:ext>
+            </a:extLst>
+          </p:cNvPr>
+          <p:cNvPicPr>
+            <a:picLocks noChangeAspect="1"/>
+          </p:cNvPicPr>
+          <p:nvPr/>
+        </p:nvPicPr>
+        <p:blipFill>
+          <a:blip r:embed="rId2"/>
+          <a:stretch>
+            <a:fillRect/>
+          </a:stretch>
+        </p:blipFill>
+        <p:spPr>
+          <a:xfrm>
+            <a:off x="0" y="0"/>
+            <a:ext cx="12192000" cy="6858000"/>
+          </a:xfrm>
+          <a:prstGeom prst="rect">
+            <a:avLst/>
+          </a:prstGeom>
+        </p:spPr>
+      </p:pic>
+    </p:spTree>
+    <p:extLst>
+      <p:ext uri="{BB962C8B-B14F-4D97-AF65-F5344CB8AC3E}">
+        <p14:creationId xmlns:p14="http://schemas.microsoft.com/office/powerpoint/2010/main" val="427102414"/>
+      </p:ext>
+    </p:extLst>
+  </p:cSld>
+  <p:clrMapOvr>
+    <a:masterClrMapping/>
+  </p:clrMapOvr>
+</p:sld>
+</file>
+
 <file path=ppt/slides/slide2.xml><?xml version="1.0" encoding="utf-8"?>
 <p:sld xmlns:a="http://schemas.openxmlformats.org/drawingml/2006/main" xmlns:r="http://schemas.openxmlformats.org/officeDocument/2006/relationships" xmlns:p="http://schemas.openxmlformats.org/presentationml/2006/main">
   <p:cSld>
@@ -4329,8 +4390,8 @@
           </a:fontRef>
         </p:style>
       </p:cxnSp>
-      <mc:AlternateContent xmlns:mc="http://schemas.openxmlformats.org/markup-compatibility/2006">
-        <mc:Choice xmlns:a14="http://schemas.microsoft.com/office/drawing/2010/main" Requires="a14">
+      <mc:AlternateContent xmlns:mc="http://schemas.openxmlformats.org/markup-compatibility/2006" xmlns:a14="http://schemas.microsoft.com/office/drawing/2010/main">
+        <mc:Choice Requires="a14">
           <p:sp>
             <p:nvSpPr>
               <p:cNvPr id="11" name="TextBox 10">
@@ -4359,6 +4420,7 @@
               </a:bodyPr>
               <a:lstStyle/>
               <a:p>
+                <a:pPr/>
                 <a14:m>
                   <m:oMathPara xmlns:m="http://schemas.openxmlformats.org/officeDocument/2006/math">
                     <m:oMathParaPr>
@@ -4391,7 +4453,7 @@
             </p:txBody>
           </p:sp>
         </mc:Choice>
-        <mc:Fallback>
+        <mc:Fallback xmlns="">
           <p:sp>
             <p:nvSpPr>
               <p:cNvPr id="11" name="TextBox 10">
@@ -4471,8 +4533,8 @@
           </a:p>
         </p:txBody>
       </p:sp>
-      <mc:AlternateContent xmlns:mc="http://schemas.openxmlformats.org/markup-compatibility/2006">
-        <mc:Choice xmlns:a14="http://schemas.microsoft.com/office/drawing/2010/main" Requires="a14">
+      <mc:AlternateContent xmlns:mc="http://schemas.openxmlformats.org/markup-compatibility/2006" xmlns:a14="http://schemas.microsoft.com/office/drawing/2010/main">
+        <mc:Choice Requires="a14">
           <p:sp>
             <p:nvSpPr>
               <p:cNvPr id="13" name="TextBox 12">
@@ -4565,7 +4627,7 @@
             </p:txBody>
           </p:sp>
         </mc:Choice>
-        <mc:Fallback>
+        <mc:Fallback xmlns="">
           <p:sp>
             <p:nvSpPr>
               <p:cNvPr id="13" name="TextBox 12">
@@ -4718,8 +4780,8 @@
           </a:fontRef>
         </p:style>
       </p:cxnSp>
-      <mc:AlternateContent xmlns:mc="http://schemas.openxmlformats.org/markup-compatibility/2006">
-        <mc:Choice xmlns:a14="http://schemas.microsoft.com/office/drawing/2010/main" Requires="a14">
+      <mc:AlternateContent xmlns:mc="http://schemas.openxmlformats.org/markup-compatibility/2006" xmlns:a14="http://schemas.microsoft.com/office/drawing/2010/main">
+        <mc:Choice Requires="a14">
           <p:sp>
             <p:nvSpPr>
               <p:cNvPr id="7" name="TextBox 6">
@@ -4748,6 +4810,7 @@
               </a:bodyPr>
               <a:lstStyle/>
               <a:p>
+                <a:pPr/>
                 <a14:m>
                   <m:oMathPara xmlns:m="http://schemas.openxmlformats.org/officeDocument/2006/math">
                     <m:oMathParaPr>
@@ -4786,7 +4849,7 @@
             </p:txBody>
           </p:sp>
         </mc:Choice>
-        <mc:Fallback>
+        <mc:Fallback xmlns="">
           <p:sp>
             <p:nvSpPr>
               <p:cNvPr id="7" name="TextBox 6">
@@ -4831,8 +4894,8 @@
           </p:sp>
         </mc:Fallback>
       </mc:AlternateContent>
-      <mc:AlternateContent xmlns:mc="http://schemas.openxmlformats.org/markup-compatibility/2006">
-        <mc:Choice xmlns:a14="http://schemas.microsoft.com/office/drawing/2010/main" Requires="a14">
+      <mc:AlternateContent xmlns:mc="http://schemas.openxmlformats.org/markup-compatibility/2006" xmlns:a14="http://schemas.microsoft.com/office/drawing/2010/main">
+        <mc:Choice Requires="a14">
           <p:sp>
             <p:nvSpPr>
               <p:cNvPr id="10" name="TextBox 9">
@@ -4871,44 +4934,60 @@
                       <m:accPr>
                         <m:chr m:val="⃗"/>
                         <m:ctrlPr>
-                          <a:rPr lang="fr-FR" i="1"/>
+                          <a:rPr lang="fr-FR" i="1">
+                            <a:latin typeface="Cambria Math" panose="02040503050406030204" pitchFamily="18" charset="0"/>
+                          </a:rPr>
                         </m:ctrlPr>
                       </m:accPr>
                       <m:e>
                         <m:r>
-                          <a:rPr lang="fr-FR" i="1"/>
+                          <a:rPr lang="fr-FR" i="1">
+                            <a:latin typeface="Cambria Math" panose="02040503050406030204" pitchFamily="18" charset="0"/>
+                          </a:rPr>
                           <m:t>𝐸</m:t>
                         </m:r>
                       </m:e>
                     </m:acc>
                     <m:r>
-                      <a:rPr lang="fr-FR" i="1"/>
+                      <a:rPr lang="fr-FR" i="1">
+                        <a:latin typeface="Cambria Math" panose="02040503050406030204" pitchFamily="18" charset="0"/>
+                      </a:rPr>
                       <m:t>=</m:t>
                     </m:r>
                     <m:acc>
                       <m:accPr>
                         <m:chr m:val="⃗"/>
                         <m:ctrlPr>
-                          <a:rPr lang="fr-FR" i="1"/>
+                          <a:rPr lang="fr-FR" i="1">
+                            <a:latin typeface="Cambria Math" panose="02040503050406030204" pitchFamily="18" charset="0"/>
+                          </a:rPr>
                         </m:ctrlPr>
                       </m:accPr>
                       <m:e>
                         <m:r>
-                          <a:rPr lang="fr-FR" i="1"/>
+                          <a:rPr lang="fr-FR" i="1">
+                            <a:latin typeface="Cambria Math" panose="02040503050406030204" pitchFamily="18" charset="0"/>
+                          </a:rPr>
                           <m:t>𝐸</m:t>
                         </m:r>
                       </m:e>
                     </m:acc>
                     <m:r>
-                      <a:rPr lang="fr-FR" i="1"/>
+                      <a:rPr lang="fr-FR" i="1">
+                        <a:latin typeface="Cambria Math" panose="02040503050406030204" pitchFamily="18" charset="0"/>
+                      </a:rPr>
                       <m:t>(</m:t>
                     </m:r>
                     <m:r>
-                      <a:rPr lang="fr-FR" i="1"/>
+                      <a:rPr lang="fr-FR" i="1">
+                        <a:latin typeface="Cambria Math" panose="02040503050406030204" pitchFamily="18" charset="0"/>
+                      </a:rPr>
                       <m:t>𝑟</m:t>
                     </m:r>
                     <m:r>
-                      <a:rPr lang="fr-FR" i="1"/>
+                      <a:rPr lang="fr-FR" i="1">
+                        <a:latin typeface="Cambria Math" panose="02040503050406030204" pitchFamily="18" charset="0"/>
+                      </a:rPr>
                       <m:t>)</m:t>
                     </m:r>
                   </m:oMath>
@@ -4918,7 +4997,7 @@
             </p:txBody>
           </p:sp>
         </mc:Choice>
-        <mc:Fallback>
+        <mc:Fallback xmlns="">
           <p:sp>
             <p:nvSpPr>
               <p:cNvPr id="10" name="TextBox 9">
@@ -4963,8 +5042,8 @@
           </p:sp>
         </mc:Fallback>
       </mc:AlternateContent>
-      <mc:AlternateContent xmlns:mc="http://schemas.openxmlformats.org/markup-compatibility/2006">
-        <mc:Choice xmlns:a14="http://schemas.microsoft.com/office/drawing/2010/main" Requires="a14">
+      <mc:AlternateContent xmlns:mc="http://schemas.openxmlformats.org/markup-compatibility/2006" xmlns:a14="http://schemas.microsoft.com/office/drawing/2010/main">
+        <mc:Choice Requires="a14">
           <p:sp>
             <p:nvSpPr>
               <p:cNvPr id="11" name="TextBox 10">
@@ -5003,18 +5082,24 @@
                       <m:accPr>
                         <m:chr m:val="⃗"/>
                         <m:ctrlPr>
-                          <a:rPr lang="fr-FR" i="1"/>
+                          <a:rPr lang="fr-FR" i="1">
+                            <a:latin typeface="Cambria Math" panose="02040503050406030204" pitchFamily="18" charset="0"/>
+                          </a:rPr>
                         </m:ctrlPr>
                       </m:accPr>
                       <m:e>
                         <m:r>
-                          <a:rPr lang="fr-FR" i="1"/>
+                          <a:rPr lang="fr-FR" i="1">
+                            <a:latin typeface="Cambria Math" panose="02040503050406030204" pitchFamily="18" charset="0"/>
+                          </a:rPr>
                           <m:t>𝐸</m:t>
                         </m:r>
                       </m:e>
                     </m:acc>
                     <m:r>
-                      <a:rPr lang="fr-FR" i="1"/>
+                      <a:rPr lang="fr-FR" i="1">
+                        <a:latin typeface="Cambria Math" panose="02040503050406030204" pitchFamily="18" charset="0"/>
+                      </a:rPr>
                       <m:t>=</m:t>
                     </m:r>
                     <m:r>
@@ -5033,7 +5118,9 @@
                       </m:dPr>
                       <m:e>
                         <m:r>
-                          <a:rPr lang="fr-FR" i="1"/>
+                          <a:rPr lang="fr-FR" i="1">
+                            <a:latin typeface="Cambria Math" panose="02040503050406030204" pitchFamily="18" charset="0"/>
+                          </a:rPr>
                           <m:t>𝑟</m:t>
                         </m:r>
                       </m:e>
@@ -5082,7 +5169,7 @@
             </p:txBody>
           </p:sp>
         </mc:Choice>
-        <mc:Fallback>
+        <mc:Fallback xmlns="">
           <p:sp>
             <p:nvSpPr>
               <p:cNvPr id="11" name="TextBox 10">
@@ -5127,8 +5214,8 @@
           </p:sp>
         </mc:Fallback>
       </mc:AlternateContent>
-      <mc:AlternateContent xmlns:mc="http://schemas.openxmlformats.org/markup-compatibility/2006">
-        <mc:Choice xmlns:a14="http://schemas.microsoft.com/office/drawing/2010/main" Requires="a14">
+      <mc:AlternateContent xmlns:mc="http://schemas.openxmlformats.org/markup-compatibility/2006" xmlns:a14="http://schemas.microsoft.com/office/drawing/2010/main">
+        <mc:Choice Requires="a14">
           <p:sp>
             <p:nvSpPr>
               <p:cNvPr id="14" name="TextBox 13">
@@ -5173,7 +5260,9 @@
                       <m:accPr>
                         <m:chr m:val="⃗"/>
                         <m:ctrlPr>
-                          <a:rPr lang="fr-FR" i="1"/>
+                          <a:rPr lang="fr-FR" i="1">
+                            <a:latin typeface="Cambria Math" panose="02040503050406030204" pitchFamily="18" charset="0"/>
+                          </a:rPr>
                         </m:ctrlPr>
                       </m:accPr>
                       <m:e>
@@ -5186,49 +5275,67 @@
                       </m:e>
                     </m:acc>
                     <m:r>
-                      <a:rPr lang="fr-FR" i="1"/>
+                      <a:rPr lang="fr-FR" i="1">
+                        <a:latin typeface="Cambria Math" panose="02040503050406030204" pitchFamily="18" charset="0"/>
+                      </a:rPr>
                       <m:t>=</m:t>
                     </m:r>
                     <m:f>
                       <m:fPr>
                         <m:ctrlPr>
-                          <a:rPr lang="fr-FR" i="1"/>
+                          <a:rPr lang="fr-FR" i="1">
+                            <a:latin typeface="Cambria Math" panose="02040503050406030204" pitchFamily="18" charset="0"/>
+                          </a:rPr>
                         </m:ctrlPr>
                       </m:fPr>
                       <m:num>
                         <m:r>
-                          <a:rPr lang="fr-FR" i="1"/>
+                          <a:rPr lang="fr-FR" i="1">
+                            <a:latin typeface="Cambria Math" panose="02040503050406030204" pitchFamily="18" charset="0"/>
+                          </a:rPr>
                           <m:t>𝜆</m:t>
                         </m:r>
                       </m:num>
                       <m:den>
                         <m:r>
-                          <a:rPr lang="fr-FR" i="1"/>
+                          <a:rPr lang="fr-FR" i="1">
+                            <a:latin typeface="Cambria Math" panose="02040503050406030204" pitchFamily="18" charset="0"/>
+                          </a:rPr>
                           <m:t>2</m:t>
                         </m:r>
                         <m:r>
-                          <a:rPr lang="fr-FR" i="1"/>
+                          <a:rPr lang="fr-FR" i="1">
+                            <a:latin typeface="Cambria Math" panose="02040503050406030204" pitchFamily="18" charset="0"/>
+                          </a:rPr>
                           <m:t>𝜋</m:t>
                         </m:r>
                         <m:r>
-                          <a:rPr lang="fr-FR" i="1"/>
+                          <a:rPr lang="fr-FR" i="1">
+                            <a:latin typeface="Cambria Math" panose="02040503050406030204" pitchFamily="18" charset="0"/>
+                          </a:rPr>
                           <m:t>𝑟</m:t>
                         </m:r>
                         <m:sSub>
                           <m:sSubPr>
                             <m:ctrlPr>
-                              <a:rPr lang="fr-FR" i="1"/>
+                              <a:rPr lang="fr-FR" i="1">
+                                <a:latin typeface="Cambria Math" panose="02040503050406030204" pitchFamily="18" charset="0"/>
+                              </a:rPr>
                             </m:ctrlPr>
                           </m:sSubPr>
                           <m:e>
                             <m:r>
-                              <a:rPr lang="fr-FR" i="1"/>
+                              <a:rPr lang="fr-FR" i="1">
+                                <a:latin typeface="Cambria Math" panose="02040503050406030204" pitchFamily="18" charset="0"/>
+                              </a:rPr>
                               <m:t>𝜖</m:t>
                             </m:r>
                           </m:e>
                           <m:sub>
                             <m:r>
-                              <a:rPr lang="fr-FR" i="1"/>
+                              <a:rPr lang="fr-FR" i="1">
+                                <a:latin typeface="Cambria Math" panose="02040503050406030204" pitchFamily="18" charset="0"/>
+                              </a:rPr>
                               <m:t>0</m:t>
                             </m:r>
                           </m:sub>
@@ -5238,7 +5345,9 @@
                     <m:sSub>
                       <m:sSubPr>
                         <m:ctrlPr>
-                          <a:rPr lang="fr-FR" i="1"/>
+                          <a:rPr lang="fr-FR" i="1">
+                            <a:latin typeface="Cambria Math" panose="02040503050406030204" pitchFamily="18" charset="0"/>
+                          </a:rPr>
                         </m:ctrlPr>
                       </m:sSubPr>
                       <m:e>
@@ -5246,12 +5355,16 @@
                           <m:accPr>
                             <m:chr m:val="⃗"/>
                             <m:ctrlPr>
-                              <a:rPr lang="fr-FR" i="1"/>
+                              <a:rPr lang="fr-FR" i="1">
+                                <a:latin typeface="Cambria Math" panose="02040503050406030204" pitchFamily="18" charset="0"/>
+                              </a:rPr>
                             </m:ctrlPr>
                           </m:accPr>
                           <m:e>
                             <m:r>
-                              <a:rPr lang="fr-FR" i="1"/>
+                              <a:rPr lang="fr-FR" i="1">
+                                <a:latin typeface="Cambria Math" panose="02040503050406030204" pitchFamily="18" charset="0"/>
+                              </a:rPr>
                               <m:t>𝑢</m:t>
                             </m:r>
                           </m:e>
@@ -5259,7 +5372,9 @@
                       </m:e>
                       <m:sub>
                         <m:r>
-                          <a:rPr lang="fr-FR" i="1"/>
+                          <a:rPr lang="fr-FR" i="1">
+                            <a:latin typeface="Cambria Math" panose="02040503050406030204" pitchFamily="18" charset="0"/>
+                          </a:rPr>
                           <m:t>𝑟</m:t>
                         </m:r>
                       </m:sub>
@@ -5271,7 +5386,7 @@
             </p:txBody>
           </p:sp>
         </mc:Choice>
-        <mc:Fallback>
+        <mc:Fallback xmlns="">
           <p:sp>
             <p:nvSpPr>
               <p:cNvPr id="14" name="TextBox 13">
@@ -5421,8 +5536,8 @@
           </a:fontRef>
         </p:style>
       </p:cxnSp>
-      <mc:AlternateContent xmlns:mc="http://schemas.openxmlformats.org/markup-compatibility/2006">
-        <mc:Choice xmlns:a14="http://schemas.microsoft.com/office/drawing/2010/main" Requires="a14">
+      <mc:AlternateContent xmlns:mc="http://schemas.openxmlformats.org/markup-compatibility/2006" xmlns:a14="http://schemas.microsoft.com/office/drawing/2010/main">
+        <mc:Choice Requires="a14">
           <p:sp>
             <p:nvSpPr>
               <p:cNvPr id="6" name="TextBox 5">
@@ -5451,6 +5566,7 @@
               </a:bodyPr>
               <a:lstStyle/>
               <a:p>
+                <a:pPr/>
                 <a14:m>
                   <m:oMathPara xmlns:m="http://schemas.openxmlformats.org/officeDocument/2006/math">
                     <m:oMathParaPr>
@@ -5541,7 +5657,7 @@
             </p:txBody>
           </p:sp>
         </mc:Choice>
-        <mc:Fallback>
+        <mc:Fallback xmlns="">
           <p:sp>
             <p:nvSpPr>
               <p:cNvPr id="6" name="TextBox 5">
@@ -5586,8 +5702,8 @@
           </p:sp>
         </mc:Fallback>
       </mc:AlternateContent>
-      <mc:AlternateContent xmlns:mc="http://schemas.openxmlformats.org/markup-compatibility/2006">
-        <mc:Choice xmlns:a14="http://schemas.microsoft.com/office/drawing/2010/main" Requires="a14">
+      <mc:AlternateContent xmlns:mc="http://schemas.openxmlformats.org/markup-compatibility/2006" xmlns:a14="http://schemas.microsoft.com/office/drawing/2010/main">
+        <mc:Choice Requires="a14">
           <p:sp>
             <p:nvSpPr>
               <p:cNvPr id="7" name="TextBox 6">
@@ -5616,6 +5732,7 @@
               </a:bodyPr>
               <a:lstStyle/>
               <a:p>
+                <a:pPr/>
                 <a14:m>
                   <m:oMathPara xmlns:m="http://schemas.openxmlformats.org/officeDocument/2006/math">
                     <m:oMathParaPr>
@@ -5691,7 +5808,7 @@
             </p:txBody>
           </p:sp>
         </mc:Choice>
-        <mc:Fallback>
+        <mc:Fallback xmlns="">
           <p:sp>
             <p:nvSpPr>
               <p:cNvPr id="7" name="TextBox 6">
@@ -6083,8 +6200,8 @@
           </a:p>
         </p:txBody>
       </p:sp>
-      <mc:AlternateContent xmlns:mc="http://schemas.openxmlformats.org/markup-compatibility/2006">
-        <mc:Choice xmlns:a14="http://schemas.microsoft.com/office/drawing/2010/main" Requires="a14">
+      <mc:AlternateContent xmlns:mc="http://schemas.openxmlformats.org/markup-compatibility/2006" xmlns:a14="http://schemas.microsoft.com/office/drawing/2010/main">
+        <mc:Choice Requires="a14">
           <p:sp>
             <p:nvSpPr>
               <p:cNvPr id="6" name="Rectangle 5">
@@ -6112,6 +6229,7 @@
               </a:bodyPr>
               <a:lstStyle/>
               <a:p>
+                <a:pPr/>
                 <a14:m>
                   <m:oMathPara xmlns:m="http://schemas.openxmlformats.org/officeDocument/2006/math">
                     <m:oMathParaPr>
@@ -6121,7 +6239,7 @@
                       <m:eqArr>
                         <m:eqArrPr>
                           <m:ctrlPr>
-                            <a:rPr lang="fr-FR" smtClean="0">
+                            <a:rPr lang="fr-FR" i="1" smtClean="0">
                               <a:latin typeface="Cambria Math" panose="02040503050406030204" pitchFamily="18" charset="0"/>
                             </a:rPr>
                           </m:ctrlPr>
@@ -6166,13 +6284,7 @@
                                 <a:rPr lang="fr-FR" i="0">
                                   <a:latin typeface="Cambria Math" panose="02040503050406030204" pitchFamily="18" charset="0"/>
                                 </a:rPr>
-                                <m:t>=</m:t>
-                              </m:r>
-                              <m:r>
-                                <a:rPr lang="fr-FR" i="0">
-                                  <a:latin typeface="Cambria Math" panose="02040503050406030204" pitchFamily="18" charset="0"/>
-                                </a:rPr>
-                                <m:t>1</m:t>
+                                <m:t>=1</m:t>
                               </m:r>
                             </m:sub>
                             <m:sup>
@@ -6197,7 +6309,7 @@
                                     <a:rPr lang="fr-FR" i="0">
                                       <a:latin typeface="Cambria Math" panose="02040503050406030204" pitchFamily="18" charset="0"/>
                                     </a:rPr>
-                                    <m:t>∂</m:t>
+                                    <m:t>𝜕</m:t>
                                   </m:r>
                                   <m:r>
                                     <a:rPr lang="fr-FR" i="1">
@@ -6211,7 +6323,7 @@
                                     <a:rPr lang="fr-FR" i="0">
                                       <a:latin typeface="Cambria Math" panose="02040503050406030204" pitchFamily="18" charset="0"/>
                                     </a:rPr>
-                                    <m:t>∂</m:t>
+                                    <m:t>𝜕</m:t>
                                   </m:r>
                                   <m:acc>
                                     <m:accPr>
@@ -6283,7 +6395,7 @@
                                             <a:rPr lang="fr-FR" i="0">
                                               <a:latin typeface="Cambria Math" panose="02040503050406030204" pitchFamily="18" charset="0"/>
                                             </a:rPr>
-                                            <m:t>∂</m:t>
+                                            <m:t>𝜕</m:t>
                                           </m:r>
                                           <m:sSub>
                                             <m:sSubPr>
@@ -6316,7 +6428,7 @@
                                             <a:rPr lang="fr-FR" i="0">
                                               <a:latin typeface="Cambria Math" panose="02040503050406030204" pitchFamily="18" charset="0"/>
                                             </a:rPr>
-                                            <m:t>∂</m:t>
+                                            <m:t>𝜕</m:t>
                                           </m:r>
                                           <m:r>
                                             <a:rPr lang="fr-FR" i="1">
@@ -6340,13 +6452,7 @@
                                     <a:rPr lang="fr-FR" i="0">
                                       <a:latin typeface="Cambria Math" panose="02040503050406030204" pitchFamily="18" charset="0"/>
                                     </a:rPr>
-                                    <m:t>=</m:t>
-                                  </m:r>
-                                  <m:r>
-                                    <a:rPr lang="fr-FR" i="0">
-                                      <a:latin typeface="Cambria Math" panose="02040503050406030204" pitchFamily="18" charset="0"/>
-                                    </a:rPr>
-                                    <m:t>0</m:t>
+                                    <m:t>=0</m:t>
                                   </m:r>
                                 </m:sub>
                               </m:sSub>
@@ -6368,7 +6474,7 @@
             </p:txBody>
           </p:sp>
         </mc:Choice>
-        <mc:Fallback>
+        <mc:Fallback xmlns="">
           <p:sp>
             <p:nvSpPr>
               <p:cNvPr id="6" name="Rectangle 5">
@@ -6413,8 +6519,8 @@
           </p:sp>
         </mc:Fallback>
       </mc:AlternateContent>
-      <mc:AlternateContent xmlns:mc="http://schemas.openxmlformats.org/markup-compatibility/2006">
-        <mc:Choice xmlns:a14="http://schemas.microsoft.com/office/drawing/2010/main" Requires="a14">
+      <mc:AlternateContent xmlns:mc="http://schemas.openxmlformats.org/markup-compatibility/2006" xmlns:a14="http://schemas.microsoft.com/office/drawing/2010/main">
+        <mc:Choice Requires="a14">
           <p:sp>
             <p:nvSpPr>
               <p:cNvPr id="7" name="Rectangle 6">
@@ -7169,7 +7275,7 @@
             </p:txBody>
           </p:sp>
         </mc:Choice>
-        <mc:Fallback>
+        <mc:Fallback xmlns="">
           <p:sp>
             <p:nvSpPr>
               <p:cNvPr id="7" name="Rectangle 6">
@@ -7321,8 +7427,8 @@
           <a:chExt cx="0" cy="0"/>
         </a:xfrm>
       </p:grpSpPr>
-      <mc:AlternateContent xmlns:mc="http://schemas.openxmlformats.org/markup-compatibility/2006">
-        <mc:Choice xmlns:a14="http://schemas.microsoft.com/office/drawing/2010/main" Requires="a14">
+      <mc:AlternateContent xmlns:mc="http://schemas.openxmlformats.org/markup-compatibility/2006" xmlns:a14="http://schemas.microsoft.com/office/drawing/2010/main">
+        <mc:Choice Requires="a14">
           <p:sp>
             <p:nvSpPr>
               <p:cNvPr id="2" name="Rectangle 1">
@@ -7578,7 +7684,7 @@
                     <m:sSup>
                       <m:sSupPr>
                         <m:ctrlPr>
-                          <a:rPr lang="fr-FR" b="0" i="0" smtClean="0">
+                          <a:rPr lang="fr-FR" b="0" i="1" smtClean="0">
                             <a:latin typeface="Cambria Math" panose="02040503050406030204" pitchFamily="18" charset="0"/>
                             <a:ea typeface="Calibri" panose="020F0502020204030204" pitchFamily="34" charset="0"/>
                             <a:cs typeface="Times New Roman" panose="02020603050405020304" pitchFamily="18" charset="0"/>
@@ -7634,7 +7740,7 @@
                     <m:sSup>
                       <m:sSupPr>
                         <m:ctrlPr>
-                          <a:rPr lang="fr-FR" b="0" i="0" smtClean="0">
+                          <a:rPr lang="fr-FR" b="0" i="1" smtClean="0">
                             <a:latin typeface="Cambria Math" panose="02040503050406030204" pitchFamily="18" charset="0"/>
                             <a:ea typeface="Calibri" panose="020F0502020204030204" pitchFamily="34" charset="0"/>
                             <a:cs typeface="Times New Roman" panose="02020603050405020304" pitchFamily="18" charset="0"/>
@@ -8053,7 +8159,7 @@
             </p:txBody>
           </p:sp>
         </mc:Choice>
-        <mc:Fallback>
+        <mc:Fallback xmlns="">
           <p:sp>
             <p:nvSpPr>
               <p:cNvPr id="2" name="Rectangle 1">
@@ -8137,8 +8243,8 @@
           </a:p>
         </p:txBody>
       </p:sp>
-      <mc:AlternateContent xmlns:mc="http://schemas.openxmlformats.org/markup-compatibility/2006">
-        <mc:Choice xmlns:a14="http://schemas.microsoft.com/office/drawing/2010/main" Requires="a14">
+      <mc:AlternateContent xmlns:mc="http://schemas.openxmlformats.org/markup-compatibility/2006" xmlns:a14="http://schemas.microsoft.com/office/drawing/2010/main">
+        <mc:Choice Requires="a14">
           <p:sp>
             <p:nvSpPr>
               <p:cNvPr id="4" name="Rectangle 3">
@@ -8166,6 +8272,7 @@
               </a:bodyPr>
               <a:lstStyle/>
               <a:p>
+                <a:pPr/>
                 <a14:m>
                   <m:oMathPara xmlns:m="http://schemas.openxmlformats.org/officeDocument/2006/math">
                     <m:oMathParaPr>
@@ -8175,7 +8282,7 @@
                       <m:eqArr>
                         <m:eqArrPr>
                           <m:ctrlPr>
-                            <a:rPr lang="fr-FR" smtClean="0">
+                            <a:rPr lang="fr-FR" i="1" smtClean="0">
                               <a:latin typeface="Cambria Math" panose="02040503050406030204" pitchFamily="18" charset="0"/>
                             </a:rPr>
                           </m:ctrlPr>
@@ -8314,7 +8421,7 @@
                                     <a:rPr lang="fr-FR" i="0">
                                       <a:latin typeface="Cambria Math" panose="02040503050406030204" pitchFamily="18" charset="0"/>
                                     </a:rPr>
-                                    <m:t>∂</m:t>
+                                    <m:t>𝜕</m:t>
                                   </m:r>
                                   <m:r>
                                     <a:rPr lang="fr-FR" i="1">
@@ -8328,7 +8435,7 @@
                                     <a:rPr lang="fr-FR" i="0">
                                       <a:latin typeface="Cambria Math" panose="02040503050406030204" pitchFamily="18" charset="0"/>
                                     </a:rPr>
-                                    <m:t>∂</m:t>
+                                    <m:t>𝜕</m:t>
                                   </m:r>
                                   <m:acc>
                                     <m:accPr>
@@ -8400,7 +8507,7 @@
                                             <a:rPr lang="fr-FR" i="0">
                                               <a:latin typeface="Cambria Math" panose="02040503050406030204" pitchFamily="18" charset="0"/>
                                             </a:rPr>
-                                            <m:t>∂</m:t>
+                                            <m:t>𝜕</m:t>
                                           </m:r>
                                           <m:sSub>
                                             <m:sSubPr>
@@ -8433,7 +8540,7 @@
                                             <a:rPr lang="fr-FR" i="0">
                                               <a:latin typeface="Cambria Math" panose="02040503050406030204" pitchFamily="18" charset="0"/>
                                             </a:rPr>
-                                            <m:t>∂</m:t>
+                                            <m:t>𝜕</m:t>
                                           </m:r>
                                           <m:r>
                                             <a:rPr lang="fr-FR" i="1">
@@ -8479,7 +8586,7 @@
             </p:txBody>
           </p:sp>
         </mc:Choice>
-        <mc:Fallback>
+        <mc:Fallback xmlns="">
           <p:sp>
             <p:nvSpPr>
               <p:cNvPr id="4" name="Rectangle 3">

</xml_diff>